<commit_message>
updated to version 2 of the presentation
</commit_message>
<xml_diff>
--- a/AzureFunctionsDeepDive.pptx
+++ b/AzureFunctionsDeepDive.pptx
@@ -19,8 +19,9 @@
     <p:sldId id="267" r:id="rId13"/>
     <p:sldId id="269" r:id="rId14"/>
     <p:sldId id="268" r:id="rId15"/>
-    <p:sldId id="270" r:id="rId16"/>
-    <p:sldId id="271" r:id="rId17"/>
+    <p:sldId id="272" r:id="rId16"/>
+    <p:sldId id="270" r:id="rId17"/>
+    <p:sldId id="271" r:id="rId18"/>
   </p:sldIdLst>
   <p:sldSz cx="12192000" cy="6858000"/>
   <p:notesSz cx="6858000" cy="9144000"/>
@@ -119,6 +120,11 @@
       </a:defRPr>
     </a:lvl9pPr>
   </p:defaultTextStyle>
+  <p:extLst>
+    <p:ext uri="{EFAFB233-063F-42B5-8137-9DF3F51BA10A}">
+      <p15:sldGuideLst xmlns:p15="http://schemas.microsoft.com/office/powerpoint/2012/main"/>
+    </p:ext>
+  </p:extLst>
 </p:presentation>
 </file>
 
@@ -1334,7 +1340,7 @@
             <a:fld id="{9334D819-9F07-4261-B09B-9E467E5D9002}" type="datetimeFigureOut">
               <a:rPr lang="en-US" dirty="0"/>
               <a:pPr/>
-              <a:t>4/10/2018</a:t>
+              <a:t>10/26/2018</a:t>
             </a:fld>
             <a:endParaRPr lang="en-US" dirty="0"/>
           </a:p>
@@ -1568,7 +1574,7 @@
           <a:p>
             <a:fld id="{9334D819-9F07-4261-B09B-9E467E5D9002}" type="datetimeFigureOut">
               <a:rPr lang="en-US" dirty="0"/>
-              <a:t>4/10/2018</a:t>
+              <a:t>10/26/2018</a:t>
             </a:fld>
             <a:endParaRPr lang="en-US" dirty="0"/>
           </a:p>
@@ -1743,7 +1749,7 @@
           <a:p>
             <a:fld id="{9334D819-9F07-4261-B09B-9E467E5D9002}" type="datetimeFigureOut">
               <a:rPr lang="en-US" dirty="0"/>
-              <a:t>4/10/2018</a:t>
+              <a:t>10/26/2018</a:t>
             </a:fld>
             <a:endParaRPr lang="en-US" dirty="0"/>
           </a:p>
@@ -1908,7 +1914,7 @@
           <a:p>
             <a:fld id="{9334D819-9F07-4261-B09B-9E467E5D9002}" type="datetimeFigureOut">
               <a:rPr lang="en-US" dirty="0"/>
-              <a:t>4/10/2018</a:t>
+              <a:t>10/26/2018</a:t>
             </a:fld>
             <a:endParaRPr lang="en-US" dirty="0"/>
           </a:p>
@@ -2177,7 +2183,7 @@
             <a:fld id="{9334D819-9F07-4261-B09B-9E467E5D9002}" type="datetimeFigureOut">
               <a:rPr lang="en-US" dirty="0"/>
               <a:pPr/>
-              <a:t>4/10/2018</a:t>
+              <a:t>10/26/2018</a:t>
             </a:fld>
             <a:endParaRPr lang="en-US" dirty="0"/>
           </a:p>
@@ -3374,7 +3380,7 @@
           <a:p>
             <a:fld id="{9334D819-9F07-4261-B09B-9E467E5D9002}" type="datetimeFigureOut">
               <a:rPr lang="en-US" dirty="0"/>
-              <a:t>4/10/2018</a:t>
+              <a:t>10/26/2018</a:t>
             </a:fld>
             <a:endParaRPr lang="en-US" dirty="0"/>
           </a:p>
@@ -3759,7 +3765,7 @@
           <a:p>
             <a:fld id="{9334D819-9F07-4261-B09B-9E467E5D9002}" type="datetimeFigureOut">
               <a:rPr lang="en-US" dirty="0"/>
-              <a:t>4/10/2018</a:t>
+              <a:t>10/26/2018</a:t>
             </a:fld>
             <a:endParaRPr lang="en-US" dirty="0"/>
           </a:p>
@@ -3877,7 +3883,7 @@
           <a:p>
             <a:fld id="{9334D819-9F07-4261-B09B-9E467E5D9002}" type="datetimeFigureOut">
               <a:rPr lang="en-US" dirty="0"/>
-              <a:t>4/10/2018</a:t>
+              <a:t>10/26/2018</a:t>
             </a:fld>
             <a:endParaRPr lang="en-US" dirty="0"/>
           </a:p>
@@ -3967,7 +3973,7 @@
           <a:p>
             <a:fld id="{9334D819-9F07-4261-B09B-9E467E5D9002}" type="datetimeFigureOut">
               <a:rPr lang="en-US" dirty="0"/>
-              <a:t>4/10/2018</a:t>
+              <a:t>10/26/2018</a:t>
             </a:fld>
             <a:endParaRPr lang="en-US" dirty="0"/>
           </a:p>
@@ -4725,7 +4731,7 @@
           <a:p>
             <a:fld id="{9334D819-9F07-4261-B09B-9E467E5D9002}" type="datetimeFigureOut">
               <a:rPr lang="en-US" dirty="0"/>
-              <a:t>4/10/2018</a:t>
+              <a:t>10/26/2018</a:t>
             </a:fld>
             <a:endParaRPr lang="en-US" dirty="0"/>
           </a:p>
@@ -5560,7 +5566,7 @@
           <a:p>
             <a:fld id="{9334D819-9F07-4261-B09B-9E467E5D9002}" type="datetimeFigureOut">
               <a:rPr lang="en-US" dirty="0"/>
-              <a:t>4/10/2018</a:t>
+              <a:t>10/26/2018</a:t>
             </a:fld>
             <a:endParaRPr lang="en-US" dirty="0"/>
           </a:p>
@@ -5783,7 +5789,7 @@
             <a:fld id="{9334D819-9F07-4261-B09B-9E467E5D9002}" type="datetimeFigureOut">
               <a:rPr lang="en-US" dirty="0"/>
               <a:pPr/>
-              <a:t>4/10/2018</a:t>
+              <a:t>10/26/2018</a:t>
             </a:fld>
             <a:endParaRPr lang="en-US" dirty="0"/>
           </a:p>
@@ -7189,7 +7195,7 @@
 </file>
 
 <file path=ppt/slides/slide13.xml><?xml version="1.0" encoding="utf-8"?>
-<p:sld xmlns:a="http://schemas.openxmlformats.org/drawingml/2006/main" xmlns:r="http://schemas.openxmlformats.org/officeDocument/2006/relationships" xmlns:p="http://schemas.openxmlformats.org/presentationml/2006/main">
+<p:sld xmlns:a="http://schemas.openxmlformats.org/drawingml/2006/main" xmlns:r="http://schemas.openxmlformats.org/officeDocument/2006/relationships" xmlns:p="http://schemas.openxmlformats.org/presentationml/2006/main" show="0">
   <p:cSld>
     <p:spTree>
       <p:nvGrpSpPr>
@@ -7407,6 +7413,120 @@
           <p:cNvPr id="2" name="Title 1">
             <a:extLst>
               <a:ext uri="{FF2B5EF4-FFF2-40B4-BE49-F238E27FC236}">
+                <a16:creationId xmlns:a16="http://schemas.microsoft.com/office/drawing/2014/main" id="{AFC70B78-D37D-440F-9D10-993A168CFEB8}"/>
+              </a:ext>
+            </a:extLst>
+          </p:cNvPr>
+          <p:cNvSpPr>
+            <a:spLocks noGrp="1"/>
+          </p:cNvSpPr>
+          <p:nvPr>
+            <p:ph type="title"/>
+          </p:nvPr>
+        </p:nvSpPr>
+        <p:spPr/>
+        <p:txBody>
+          <a:bodyPr/>
+          <a:lstStyle/>
+          <a:p>
+            <a:r>
+              <a:rPr lang="en-US" dirty="0"/>
+              <a:t>Azure Functions Language </a:t>
+            </a:r>
+            <a:r>
+              <a:rPr lang="en-US" dirty="0" err="1"/>
+              <a:t>Exensibiliity</a:t>
+            </a:r>
+            <a:endParaRPr lang="en-US" dirty="0"/>
+          </a:p>
+        </p:txBody>
+      </p:sp>
+      <p:sp>
+        <p:nvSpPr>
+          <p:cNvPr id="3" name="Content Placeholder 2">
+            <a:extLst>
+              <a:ext uri="{FF2B5EF4-FFF2-40B4-BE49-F238E27FC236}">
+                <a16:creationId xmlns:a16="http://schemas.microsoft.com/office/drawing/2014/main" id="{F6ECBFDB-25F2-44C0-BB59-AF099B121424}"/>
+              </a:ext>
+            </a:extLst>
+          </p:cNvPr>
+          <p:cNvSpPr>
+            <a:spLocks noGrp="1"/>
+          </p:cNvSpPr>
+          <p:nvPr>
+            <p:ph idx="1"/>
+          </p:nvPr>
+        </p:nvSpPr>
+        <p:spPr/>
+        <p:txBody>
+          <a:bodyPr/>
+          <a:lstStyle/>
+          <a:p>
+            <a:r>
+              <a:rPr lang="en-US" dirty="0"/>
+              <a:t>Specs: </a:t>
+            </a:r>
+            <a:r>
+              <a:rPr lang="en-US" dirty="0">
+                <a:hlinkClick r:id="rId2"/>
+              </a:rPr>
+              <a:t>https://github.com/Azure/azure-functions-host/wiki/Language-Extensibility</a:t>
+            </a:r>
+            <a:endParaRPr lang="en-US" dirty="0"/>
+          </a:p>
+          <a:p>
+            <a:r>
+              <a:rPr lang="en-US" dirty="0"/>
+              <a:t>The Proto: </a:t>
+            </a:r>
+            <a:r>
+              <a:rPr lang="en-US" dirty="0">
+                <a:hlinkClick r:id="rId3"/>
+              </a:rPr>
+              <a:t>https://github.com/Azure/azure-functions-language-worker-protobuf/blob/dev/src/proto/FunctionRpc.proto</a:t>
+            </a:r>
+            <a:endParaRPr lang="en-US" dirty="0"/>
+          </a:p>
+          <a:p>
+            <a:endParaRPr lang="en-US" dirty="0"/>
+          </a:p>
+        </p:txBody>
+      </p:sp>
+    </p:spTree>
+    <p:extLst>
+      <p:ext uri="{BB962C8B-B14F-4D97-AF65-F5344CB8AC3E}">
+        <p14:creationId xmlns:p14="http://schemas.microsoft.com/office/powerpoint/2010/main" val="3262942883"/>
+      </p:ext>
+    </p:extLst>
+  </p:cSld>
+  <p:clrMapOvr>
+    <a:masterClrMapping/>
+  </p:clrMapOvr>
+</p:sld>
+</file>
+
+<file path=ppt/slides/slide16.xml><?xml version="1.0" encoding="utf-8"?>
+<p:sld xmlns:a="http://schemas.openxmlformats.org/drawingml/2006/main" xmlns:r="http://schemas.openxmlformats.org/officeDocument/2006/relationships" xmlns:p="http://schemas.openxmlformats.org/presentationml/2006/main">
+  <p:cSld>
+    <p:spTree>
+      <p:nvGrpSpPr>
+        <p:cNvPr id="1" name=""/>
+        <p:cNvGrpSpPr/>
+        <p:nvPr/>
+      </p:nvGrpSpPr>
+      <p:grpSpPr>
+        <a:xfrm>
+          <a:off x="0" y="0"/>
+          <a:ext cx="0" cy="0"/>
+          <a:chOff x="0" y="0"/>
+          <a:chExt cx="0" cy="0"/>
+        </a:xfrm>
+      </p:grpSpPr>
+      <p:sp>
+        <p:nvSpPr>
+          <p:cNvPr id="2" name="Title 1">
+            <a:extLst>
+              <a:ext uri="{FF2B5EF4-FFF2-40B4-BE49-F238E27FC236}">
                 <a16:creationId xmlns:a16="http://schemas.microsoft.com/office/drawing/2014/main" id="{4B38ED75-7758-40BC-A5A3-0EBEBE359673}"/>
               </a:ext>
             </a:extLst>
@@ -7491,7 +7611,7 @@
               <a:rPr lang="en-CA" dirty="0">
                 <a:hlinkClick r:id="rId3"/>
               </a:rPr>
-              <a:t>https://gist.github.com/dersia/ca62f17138b6226d9b6cddd0406c9c5d</a:t>
+              <a:t>https://github.com/Azure/azure-functions-host/wiki</a:t>
             </a:r>
             <a:endParaRPr lang="en-CA" dirty="0"/>
           </a:p>
@@ -7543,7 +7663,7 @@
 </p:sld>
 </file>
 
-<file path=ppt/slides/slide16.xml><?xml version="1.0" encoding="utf-8"?>
+<file path=ppt/slides/slide17.xml><?xml version="1.0" encoding="utf-8"?>
 <p:sld xmlns:a="http://schemas.openxmlformats.org/drawingml/2006/main" xmlns:r="http://schemas.openxmlformats.org/officeDocument/2006/relationships" xmlns:p="http://schemas.openxmlformats.org/presentationml/2006/main">
   <p:cSld>
     <p:spTree>
@@ -7701,6 +7821,12 @@
           <a:p>
             <a:r>
               <a:rPr lang="en-CA" dirty="0"/>
+              <a:t>Azure Functions Language Extensibility</a:t>
+            </a:r>
+          </a:p>
+          <a:p>
+            <a:r>
+              <a:rPr lang="en-CA" dirty="0"/>
               <a:t>Debugging</a:t>
             </a:r>
             <a:endParaRPr lang="en-US" dirty="0"/>
@@ -7807,22 +7933,17 @@
           <a:p>
             <a:r>
               <a:rPr lang="en-CA" dirty="0"/>
+              <a:t>Azure Functions V2+</a:t>
+            </a:r>
+          </a:p>
+          <a:p>
+            <a:r>
+              <a:rPr lang="en-CA" dirty="0"/>
               <a:t>Azure Functions </a:t>
             </a:r>
             <a:r>
               <a:rPr lang="en-CA" dirty="0" err="1"/>
               <a:t>vNext</a:t>
-            </a:r>
-            <a:endParaRPr lang="en-CA" dirty="0"/>
-          </a:p>
-          <a:p>
-            <a:r>
-              <a:rPr lang="en-CA" dirty="0"/>
-              <a:t>Azure Functions </a:t>
-            </a:r>
-            <a:r>
-              <a:rPr lang="en-CA" dirty="0" err="1"/>
-              <a:t>vUberNext</a:t>
             </a:r>
             <a:endParaRPr lang="en-US" dirty="0"/>
           </a:p>
@@ -7889,6 +8010,34 @@
       </p:sp>
       <p:sp>
         <p:nvSpPr>
+          <p:cNvPr id="4" name="Text Placeholder 3">
+            <a:extLst>
+              <a:ext uri="{FF2B5EF4-FFF2-40B4-BE49-F238E27FC236}">
+                <a16:creationId xmlns:a16="http://schemas.microsoft.com/office/drawing/2014/main" id="{F17D1D33-12C4-4328-B292-D2CB0209F978}"/>
+              </a:ext>
+            </a:extLst>
+          </p:cNvPr>
+          <p:cNvSpPr>
+            <a:spLocks noGrp="1"/>
+          </p:cNvSpPr>
+          <p:nvPr>
+            <p:ph type="body" idx="1"/>
+          </p:nvPr>
+        </p:nvSpPr>
+        <p:spPr/>
+        <p:txBody>
+          <a:bodyPr/>
+          <a:lstStyle/>
+          <a:p>
+            <a:r>
+              <a:rPr lang="en-US" dirty="0"/>
+              <a:t>Features</a:t>
+            </a:r>
+          </a:p>
+        </p:txBody>
+      </p:sp>
+      <p:sp>
+        <p:nvSpPr>
           <p:cNvPr id="3" name="Content Placeholder 2">
             <a:extLst>
               <a:ext uri="{FF2B5EF4-FFF2-40B4-BE49-F238E27FC236}">
@@ -7900,7 +8049,115 @@
             <a:spLocks noGrp="1"/>
           </p:cNvSpPr>
           <p:nvPr>
-            <p:ph idx="1"/>
+            <p:ph sz="half" idx="2"/>
+          </p:nvPr>
+        </p:nvSpPr>
+        <p:spPr/>
+        <p:txBody>
+          <a:bodyPr>
+            <a:normAutofit fontScale="92500" lnSpcReduction="20000"/>
+          </a:bodyPr>
+          <a:lstStyle/>
+          <a:p>
+            <a:r>
+              <a:rPr lang="en-CA" dirty="0"/>
+              <a:t>Language support: C#, JavaScript, TypeScript, F#</a:t>
+            </a:r>
+          </a:p>
+          <a:p>
+            <a:r>
+              <a:rPr lang="en-CA" dirty="0"/>
+              <a:t>Predefined Bindings: Azure Storage, </a:t>
+            </a:r>
+            <a:r>
+              <a:rPr lang="en-CA" dirty="0" err="1"/>
+              <a:t>EventHub</a:t>
+            </a:r>
+            <a:r>
+              <a:rPr lang="en-CA" dirty="0"/>
+              <a:t>, </a:t>
+            </a:r>
+            <a:r>
+              <a:rPr lang="en-CA" dirty="0" err="1"/>
+              <a:t>EventGrid</a:t>
+            </a:r>
+            <a:r>
+              <a:rPr lang="en-CA" dirty="0"/>
+              <a:t>, </a:t>
+            </a:r>
+            <a:r>
+              <a:rPr lang="en-CA" dirty="0" err="1"/>
+              <a:t>ServiceBus</a:t>
+            </a:r>
+            <a:r>
+              <a:rPr lang="en-CA" dirty="0"/>
+              <a:t>, </a:t>
+            </a:r>
+            <a:r>
+              <a:rPr lang="en-CA" dirty="0" err="1"/>
+              <a:t>etc</a:t>
+            </a:r>
+            <a:r>
+              <a:rPr lang="en-CA" dirty="0"/>
+              <a:t>…</a:t>
+            </a:r>
+          </a:p>
+          <a:p>
+            <a:r>
+              <a:rPr lang="en-CA" dirty="0"/>
+              <a:t>Predefined Triggers: Http, </a:t>
+            </a:r>
+            <a:r>
+              <a:rPr lang="en-CA" dirty="0" err="1"/>
+              <a:t>EventHub</a:t>
+            </a:r>
+            <a:r>
+              <a:rPr lang="en-CA" dirty="0"/>
+              <a:t>, Storage Blob/Queue, </a:t>
+            </a:r>
+            <a:r>
+              <a:rPr lang="en-CA" dirty="0" err="1"/>
+              <a:t>etc</a:t>
+            </a:r>
+            <a:r>
+              <a:rPr lang="en-CA" dirty="0"/>
+              <a:t>…</a:t>
+            </a:r>
+          </a:p>
+          <a:p>
+            <a:r>
+              <a:rPr lang="en-CA" dirty="0"/>
+              <a:t>Functions Host on Azure</a:t>
+            </a:r>
+          </a:p>
+          <a:p>
+            <a:r>
+              <a:rPr lang="en-CA" dirty="0"/>
+              <a:t>In-Proc Worker</a:t>
+            </a:r>
+          </a:p>
+          <a:p>
+            <a:r>
+              <a:rPr lang="en-CA" dirty="0"/>
+              <a:t>Kudu-Deploy</a:t>
+            </a:r>
+          </a:p>
+        </p:txBody>
+      </p:sp>
+      <p:sp>
+        <p:nvSpPr>
+          <p:cNvPr id="5" name="Text Placeholder 4">
+            <a:extLst>
+              <a:ext uri="{FF2B5EF4-FFF2-40B4-BE49-F238E27FC236}">
+                <a16:creationId xmlns:a16="http://schemas.microsoft.com/office/drawing/2014/main" id="{510DDB55-007E-4C48-A9E5-63FF65F1A192}"/>
+              </a:ext>
+            </a:extLst>
+          </p:cNvPr>
+          <p:cNvSpPr>
+            <a:spLocks noGrp="1"/>
+          </p:cNvSpPr>
+          <p:nvPr>
+            <p:ph type="body" sz="quarter" idx="3"/>
           </p:nvPr>
         </p:nvSpPr>
         <p:spPr/>
@@ -7909,88 +8166,62 @@
           <a:lstStyle/>
           <a:p>
             <a:r>
-              <a:rPr lang="en-CA" dirty="0"/>
-              <a:t>Language support: C#, JavaScript, TypeScript, F#</a:t>
-            </a:r>
-          </a:p>
-          <a:p>
-            <a:r>
-              <a:rPr lang="en-CA" dirty="0"/>
-              <a:t>Predefined Bindings: Azure Storage, </a:t>
-            </a:r>
-            <a:r>
-              <a:rPr lang="en-CA" dirty="0" err="1"/>
-              <a:t>EventHub</a:t>
-            </a:r>
-            <a:r>
-              <a:rPr lang="en-CA" dirty="0"/>
-              <a:t>, </a:t>
-            </a:r>
-            <a:r>
-              <a:rPr lang="en-CA" dirty="0" err="1"/>
-              <a:t>EventGrid</a:t>
-            </a:r>
-            <a:r>
-              <a:rPr lang="en-CA" dirty="0"/>
-              <a:t>, </a:t>
-            </a:r>
-            <a:r>
-              <a:rPr lang="en-CA" dirty="0" err="1"/>
-              <a:t>ServiceBus</a:t>
-            </a:r>
-            <a:r>
-              <a:rPr lang="en-CA" dirty="0"/>
-              <a:t>, </a:t>
-            </a:r>
-            <a:r>
-              <a:rPr lang="en-CA" dirty="0" err="1"/>
-              <a:t>etc</a:t>
-            </a:r>
-            <a:r>
-              <a:rPr lang="en-CA" dirty="0"/>
-              <a:t>…</a:t>
-            </a:r>
-          </a:p>
-          <a:p>
-            <a:r>
-              <a:rPr lang="en-CA" dirty="0"/>
-              <a:t>Predefined Triggers: Http, </a:t>
-            </a:r>
-            <a:r>
-              <a:rPr lang="en-CA" dirty="0" err="1"/>
-              <a:t>EventHub</a:t>
-            </a:r>
-            <a:r>
-              <a:rPr lang="en-CA" dirty="0"/>
-              <a:t>, Storage Blob/Queue, </a:t>
-            </a:r>
-            <a:r>
-              <a:rPr lang="en-CA" dirty="0" err="1"/>
-              <a:t>etc</a:t>
-            </a:r>
-            <a:r>
-              <a:rPr lang="en-CA" dirty="0"/>
-              <a:t>…</a:t>
-            </a:r>
-          </a:p>
-          <a:p>
-            <a:r>
-              <a:rPr lang="en-CA" dirty="0"/>
-              <a:t>Functions Host on Azure</a:t>
-            </a:r>
-          </a:p>
-          <a:p>
-            <a:r>
-              <a:rPr lang="en-CA" dirty="0"/>
-              <a:t>In-Proc Worker</a:t>
-            </a:r>
-          </a:p>
-          <a:p>
-            <a:r>
-              <a:rPr lang="en-CA" dirty="0"/>
-              <a:t>Kudu-Deploy</a:t>
+              <a:rPr lang="en-US" dirty="0"/>
+              <a:t>Cons</a:t>
+            </a:r>
+          </a:p>
+        </p:txBody>
+      </p:sp>
+      <p:sp>
+        <p:nvSpPr>
+          <p:cNvPr id="6" name="Content Placeholder 5">
+            <a:extLst>
+              <a:ext uri="{FF2B5EF4-FFF2-40B4-BE49-F238E27FC236}">
+                <a16:creationId xmlns:a16="http://schemas.microsoft.com/office/drawing/2014/main" id="{740874ED-9EBE-4B55-AA73-106D850BC27F}"/>
+              </a:ext>
+            </a:extLst>
+          </p:cNvPr>
+          <p:cNvSpPr>
+            <a:spLocks noGrp="1"/>
+          </p:cNvSpPr>
+          <p:nvPr>
+            <p:ph sz="quarter" idx="4"/>
+          </p:nvPr>
+        </p:nvSpPr>
+        <p:spPr/>
+        <p:txBody>
+          <a:bodyPr>
+            <a:normAutofit fontScale="92500" lnSpcReduction="20000"/>
+          </a:bodyPr>
+          <a:lstStyle/>
+          <a:p>
+            <a:r>
+              <a:rPr lang="en-US" dirty="0"/>
+              <a:t>.NET </a:t>
+            </a:r>
+            <a:r>
+              <a:rPr lang="en-US" dirty="0" err="1"/>
+              <a:t>Fullframework</a:t>
             </a:r>
             <a:endParaRPr lang="en-US" dirty="0"/>
+          </a:p>
+          <a:p>
+            <a:r>
+              <a:rPr lang="en-US" dirty="0"/>
+              <a:t>The Steffen-Issue</a:t>
+            </a:r>
+          </a:p>
+          <a:p>
+            <a:r>
+              <a:rPr lang="en-US" dirty="0"/>
+              <a:t>When using Assemblies used by host limited in version</a:t>
+            </a:r>
+          </a:p>
+          <a:p>
+            <a:r>
+              <a:rPr lang="en-US" dirty="0"/>
+              <a:t>Dev-Tools not good enough</a:t>
+            </a:r>
           </a:p>
         </p:txBody>
       </p:sp>
@@ -8055,6 +8286,34 @@
       </p:sp>
       <p:sp>
         <p:nvSpPr>
+          <p:cNvPr id="4" name="Text Placeholder 3">
+            <a:extLst>
+              <a:ext uri="{FF2B5EF4-FFF2-40B4-BE49-F238E27FC236}">
+                <a16:creationId xmlns:a16="http://schemas.microsoft.com/office/drawing/2014/main" id="{A7B7EB32-022E-4913-B316-224DFAB2BA10}"/>
+              </a:ext>
+            </a:extLst>
+          </p:cNvPr>
+          <p:cNvSpPr>
+            <a:spLocks noGrp="1"/>
+          </p:cNvSpPr>
+          <p:nvPr>
+            <p:ph type="body" idx="1"/>
+          </p:nvPr>
+        </p:nvSpPr>
+        <p:spPr/>
+        <p:txBody>
+          <a:bodyPr/>
+          <a:lstStyle/>
+          <a:p>
+            <a:r>
+              <a:rPr lang="en-US" dirty="0"/>
+              <a:t>Features</a:t>
+            </a:r>
+          </a:p>
+        </p:txBody>
+      </p:sp>
+      <p:sp>
+        <p:nvSpPr>
           <p:cNvPr id="3" name="Content Placeholder 2">
             <a:extLst>
               <a:ext uri="{FF2B5EF4-FFF2-40B4-BE49-F238E27FC236}">
@@ -8066,7 +8325,7 @@
             <a:spLocks noGrp="1"/>
           </p:cNvSpPr>
           <p:nvPr>
-            <p:ph idx="1"/>
+            <p:ph sz="half" idx="2"/>
           </p:nvPr>
         </p:nvSpPr>
         <p:spPr/>
@@ -8087,6 +8346,88 @@
             <a:r>
               <a:rPr lang="en-CA" dirty="0"/>
               <a:t>Http-Scale V2</a:t>
+            </a:r>
+          </a:p>
+          <a:p>
+            <a:endParaRPr lang="en-US" dirty="0"/>
+          </a:p>
+        </p:txBody>
+      </p:sp>
+      <p:sp>
+        <p:nvSpPr>
+          <p:cNvPr id="5" name="Text Placeholder 4">
+            <a:extLst>
+              <a:ext uri="{FF2B5EF4-FFF2-40B4-BE49-F238E27FC236}">
+                <a16:creationId xmlns:a16="http://schemas.microsoft.com/office/drawing/2014/main" id="{D7AF5806-670E-4FD4-A49E-F7E1AF8E4608}"/>
+              </a:ext>
+            </a:extLst>
+          </p:cNvPr>
+          <p:cNvSpPr>
+            <a:spLocks noGrp="1"/>
+          </p:cNvSpPr>
+          <p:nvPr>
+            <p:ph type="body" sz="quarter" idx="3"/>
+          </p:nvPr>
+        </p:nvSpPr>
+        <p:spPr/>
+        <p:txBody>
+          <a:bodyPr/>
+          <a:lstStyle/>
+          <a:p>
+            <a:r>
+              <a:rPr lang="en-US" dirty="0"/>
+              <a:t>Cons</a:t>
+            </a:r>
+          </a:p>
+        </p:txBody>
+      </p:sp>
+      <p:sp>
+        <p:nvSpPr>
+          <p:cNvPr id="6" name="Content Placeholder 5">
+            <a:extLst>
+              <a:ext uri="{FF2B5EF4-FFF2-40B4-BE49-F238E27FC236}">
+                <a16:creationId xmlns:a16="http://schemas.microsoft.com/office/drawing/2014/main" id="{7253953A-DA02-4C61-8CBC-1E4ECF560C80}"/>
+              </a:ext>
+            </a:extLst>
+          </p:cNvPr>
+          <p:cNvSpPr>
+            <a:spLocks noGrp="1"/>
+          </p:cNvSpPr>
+          <p:nvPr>
+            <p:ph sz="quarter" idx="4"/>
+          </p:nvPr>
+        </p:nvSpPr>
+        <p:spPr/>
+        <p:txBody>
+          <a:bodyPr/>
+          <a:lstStyle/>
+          <a:p>
+            <a:r>
+              <a:rPr lang="en-US" dirty="0"/>
+              <a:t>.NET </a:t>
+            </a:r>
+            <a:r>
+              <a:rPr lang="en-US" dirty="0" err="1"/>
+              <a:t>Fullframework</a:t>
+            </a:r>
+            <a:endParaRPr lang="en-US" dirty="0"/>
+          </a:p>
+          <a:p>
+            <a:r>
+              <a:rPr lang="en-US" dirty="0"/>
+              <a:t>The Steffen-Issue</a:t>
+            </a:r>
+          </a:p>
+          <a:p>
+            <a:r>
+              <a:rPr lang="en-US" dirty="0"/>
+              <a:t>When using Assemblies used by host limited in version</a:t>
+            </a:r>
+          </a:p>
+          <a:p>
+            <a:r>
+              <a:rPr lang="en-US" dirty="0"/>
+              <a:t>Dev-Tools not good enough</a:t>
             </a:r>
           </a:p>
           <a:p>
@@ -8162,6 +8503,34 @@
       </p:sp>
       <p:sp>
         <p:nvSpPr>
+          <p:cNvPr id="4" name="Text Placeholder 3">
+            <a:extLst>
+              <a:ext uri="{FF2B5EF4-FFF2-40B4-BE49-F238E27FC236}">
+                <a16:creationId xmlns:a16="http://schemas.microsoft.com/office/drawing/2014/main" id="{CB63142D-9E34-42D0-917A-37D57039C7BF}"/>
+              </a:ext>
+            </a:extLst>
+          </p:cNvPr>
+          <p:cNvSpPr>
+            <a:spLocks noGrp="1"/>
+          </p:cNvSpPr>
+          <p:nvPr>
+            <p:ph type="body" idx="1"/>
+          </p:nvPr>
+        </p:nvSpPr>
+        <p:spPr/>
+        <p:txBody>
+          <a:bodyPr/>
+          <a:lstStyle/>
+          <a:p>
+            <a:r>
+              <a:rPr lang="en-US" dirty="0"/>
+              <a:t>Features</a:t>
+            </a:r>
+          </a:p>
+        </p:txBody>
+      </p:sp>
+      <p:sp>
+        <p:nvSpPr>
           <p:cNvPr id="3" name="Content Placeholder 2">
             <a:extLst>
               <a:ext uri="{FF2B5EF4-FFF2-40B4-BE49-F238E27FC236}">
@@ -8173,7 +8542,7 @@
             <a:spLocks noGrp="1"/>
           </p:cNvSpPr>
           <p:nvPr>
-            <p:ph idx="1"/>
+            <p:ph sz="half" idx="2"/>
           </p:nvPr>
         </p:nvSpPr>
         <p:spPr/>
@@ -8189,37 +8558,77 @@
           <a:p>
             <a:r>
               <a:rPr lang="en-CA" dirty="0"/>
-              <a:t>Out-of-Proc Worker (</a:t>
-            </a:r>
-            <a:r>
-              <a:rPr lang="en-CA" dirty="0" err="1"/>
-              <a:t>gRPC</a:t>
-            </a:r>
-            <a:r>
-              <a:rPr lang="en-CA" dirty="0"/>
-              <a:t>) for JavaScript</a:t>
-            </a:r>
-          </a:p>
-          <a:p>
-            <a:r>
-              <a:rPr lang="en-CA" dirty="0"/>
-              <a:t>Supported Languages (</a:t>
-            </a:r>
-            <a:r>
-              <a:rPr lang="en-CA" dirty="0" err="1"/>
-              <a:t>ooproc</a:t>
-            </a:r>
-            <a:r>
-              <a:rPr lang="en-CA" dirty="0"/>
-              <a:t>): Java, Golang</a:t>
-            </a:r>
-          </a:p>
-          <a:p>
-            <a:r>
-              <a:rPr lang="en-CA" dirty="0"/>
               <a:t>.NET Core</a:t>
             </a:r>
             <a:endParaRPr lang="en-US" dirty="0"/>
+          </a:p>
+        </p:txBody>
+      </p:sp>
+      <p:sp>
+        <p:nvSpPr>
+          <p:cNvPr id="5" name="Text Placeholder 4">
+            <a:extLst>
+              <a:ext uri="{FF2B5EF4-FFF2-40B4-BE49-F238E27FC236}">
+                <a16:creationId xmlns:a16="http://schemas.microsoft.com/office/drawing/2014/main" id="{24C403BB-4441-47E9-BBFE-2381C6D74FD1}"/>
+              </a:ext>
+            </a:extLst>
+          </p:cNvPr>
+          <p:cNvSpPr>
+            <a:spLocks noGrp="1"/>
+          </p:cNvSpPr>
+          <p:nvPr>
+            <p:ph type="body" sz="quarter" idx="3"/>
+          </p:nvPr>
+        </p:nvSpPr>
+        <p:spPr/>
+        <p:txBody>
+          <a:bodyPr/>
+          <a:lstStyle/>
+          <a:p>
+            <a:r>
+              <a:rPr lang="en-US" dirty="0"/>
+              <a:t>Cons</a:t>
+            </a:r>
+          </a:p>
+        </p:txBody>
+      </p:sp>
+      <p:sp>
+        <p:nvSpPr>
+          <p:cNvPr id="6" name="Content Placeholder 5">
+            <a:extLst>
+              <a:ext uri="{FF2B5EF4-FFF2-40B4-BE49-F238E27FC236}">
+                <a16:creationId xmlns:a16="http://schemas.microsoft.com/office/drawing/2014/main" id="{6C9924E9-A97B-4F11-A165-D504723393D2}"/>
+              </a:ext>
+            </a:extLst>
+          </p:cNvPr>
+          <p:cNvSpPr>
+            <a:spLocks noGrp="1"/>
+          </p:cNvSpPr>
+          <p:nvPr>
+            <p:ph sz="quarter" idx="4"/>
+          </p:nvPr>
+        </p:nvSpPr>
+        <p:spPr/>
+        <p:txBody>
+          <a:bodyPr/>
+          <a:lstStyle/>
+          <a:p>
+            <a:r>
+              <a:rPr lang="en-US" dirty="0"/>
+              <a:t>The Steffen-Issue</a:t>
+            </a:r>
+          </a:p>
+          <a:p>
+            <a:r>
+              <a:rPr lang="en-US" dirty="0"/>
+              <a:t>Limited on a few assemblies that are needed in a specific version by core</a:t>
+            </a:r>
+          </a:p>
+          <a:p>
+            <a:r>
+              <a:rPr lang="en-US" dirty="0"/>
+              <a:t>Less supported Languages</a:t>
+            </a:r>
           </a:p>
         </p:txBody>
       </p:sp>
@@ -8279,14 +8688,38 @@
               <a:t>Azure Functions </a:t>
             </a:r>
             <a:r>
-              <a:rPr lang="en-CA" cap="none" dirty="0" err="1"/>
-              <a:t>v</a:t>
-            </a:r>
-            <a:r>
-              <a:rPr lang="en-CA" dirty="0" err="1"/>
-              <a:t>Next</a:t>
+              <a:rPr lang="en-CA" cap="none" dirty="0"/>
+              <a:t>V2 (GA)</a:t>
             </a:r>
             <a:endParaRPr lang="en-US" dirty="0"/>
+          </a:p>
+        </p:txBody>
+      </p:sp>
+      <p:sp>
+        <p:nvSpPr>
+          <p:cNvPr id="6" name="Text Placeholder 5">
+            <a:extLst>
+              <a:ext uri="{FF2B5EF4-FFF2-40B4-BE49-F238E27FC236}">
+                <a16:creationId xmlns:a16="http://schemas.microsoft.com/office/drawing/2014/main" id="{DB589ECB-D9BD-4DCF-966C-7219F454B873}"/>
+              </a:ext>
+            </a:extLst>
+          </p:cNvPr>
+          <p:cNvSpPr>
+            <a:spLocks noGrp="1"/>
+          </p:cNvSpPr>
+          <p:nvPr>
+            <p:ph type="body" idx="1"/>
+          </p:nvPr>
+        </p:nvSpPr>
+        <p:spPr/>
+        <p:txBody>
+          <a:bodyPr/>
+          <a:lstStyle/>
+          <a:p>
+            <a:r>
+              <a:rPr lang="en-US" dirty="0"/>
+              <a:t>Features</a:t>
+            </a:r>
           </a:p>
         </p:txBody>
       </p:sp>
@@ -8303,7 +8736,98 @@
             <a:spLocks noGrp="1"/>
           </p:cNvSpPr>
           <p:nvPr>
-            <p:ph idx="1"/>
+            <p:ph sz="half" idx="2"/>
+          </p:nvPr>
+        </p:nvSpPr>
+        <p:spPr/>
+        <p:txBody>
+          <a:bodyPr>
+            <a:normAutofit fontScale="92500" lnSpcReduction="10000"/>
+          </a:bodyPr>
+          <a:lstStyle/>
+          <a:p>
+            <a:r>
+              <a:rPr lang="en-CA" dirty="0"/>
+              <a:t>Out-of-Proc Worker (</a:t>
+            </a:r>
+            <a:r>
+              <a:rPr lang="en-CA" dirty="0" err="1"/>
+              <a:t>gRPC</a:t>
+            </a:r>
+            <a:r>
+              <a:rPr lang="en-CA" dirty="0"/>
+              <a:t>) for JavaScript</a:t>
+            </a:r>
+          </a:p>
+          <a:p>
+            <a:r>
+              <a:rPr lang="en-CA" dirty="0"/>
+              <a:t>Supported Languages (</a:t>
+            </a:r>
+            <a:r>
+              <a:rPr lang="en-CA" dirty="0" err="1"/>
+              <a:t>ooproc</a:t>
+            </a:r>
+            <a:r>
+              <a:rPr lang="en-CA" dirty="0"/>
+              <a:t>): Node.js, Java, Golang</a:t>
+            </a:r>
+          </a:p>
+          <a:p>
+            <a:r>
+              <a:rPr lang="en-CA" dirty="0"/>
+              <a:t>Docker Support</a:t>
+            </a:r>
+          </a:p>
+          <a:p>
+            <a:r>
+              <a:rPr lang="en-CA" dirty="0"/>
+              <a:t>Better Scaling</a:t>
+            </a:r>
+          </a:p>
+          <a:p>
+            <a:r>
+              <a:rPr lang="en-CA" dirty="0"/>
+              <a:t>Better Performance</a:t>
+            </a:r>
+          </a:p>
+          <a:p>
+            <a:r>
+              <a:rPr lang="en-CA" dirty="0"/>
+              <a:t>Host runs on Service Fabric Mesh</a:t>
+            </a:r>
+          </a:p>
+          <a:p>
+            <a:r>
+              <a:rPr lang="en-CA" dirty="0"/>
+              <a:t>New </a:t>
+            </a:r>
+            <a:r>
+              <a:rPr lang="en-CA" dirty="0" err="1"/>
+              <a:t>host.json</a:t>
+            </a:r>
+            <a:r>
+              <a:rPr lang="en-CA" dirty="0"/>
+              <a:t> (V2)</a:t>
+            </a:r>
+            <a:endParaRPr lang="en-US" dirty="0"/>
+          </a:p>
+        </p:txBody>
+      </p:sp>
+      <p:sp>
+        <p:nvSpPr>
+          <p:cNvPr id="7" name="Text Placeholder 6">
+            <a:extLst>
+              <a:ext uri="{FF2B5EF4-FFF2-40B4-BE49-F238E27FC236}">
+                <a16:creationId xmlns:a16="http://schemas.microsoft.com/office/drawing/2014/main" id="{679F4E80-9B0F-4F55-B4E8-11388F67E588}"/>
+              </a:ext>
+            </a:extLst>
+          </p:cNvPr>
+          <p:cNvSpPr>
+            <a:spLocks noGrp="1"/>
+          </p:cNvSpPr>
+          <p:nvPr>
+            <p:ph type="body" sz="quarter" idx="3"/>
           </p:nvPr>
         </p:nvSpPr>
         <p:spPr/>
@@ -8312,51 +8836,57 @@
           <a:lstStyle/>
           <a:p>
             <a:r>
-              <a:rPr lang="en-CA" dirty="0" err="1"/>
-              <a:t>gRPC</a:t>
-            </a:r>
-            <a:r>
-              <a:rPr lang="en-CA" dirty="0"/>
-              <a:t> for all Languages </a:t>
-            </a:r>
-          </a:p>
-          <a:p>
-            <a:r>
-              <a:rPr lang="en-CA" dirty="0"/>
-              <a:t>Better Scaling</a:t>
-            </a:r>
-          </a:p>
-          <a:p>
-            <a:r>
-              <a:rPr lang="en-CA" dirty="0"/>
-              <a:t>Better Performance</a:t>
-            </a:r>
-          </a:p>
-          <a:p>
-            <a:r>
-              <a:rPr lang="en-CA" dirty="0"/>
-              <a:t>Host runs on </a:t>
-            </a:r>
-            <a:r>
-              <a:rPr lang="en-CA" b="1" i="1" u="sng" spc="600" dirty="0">
-                <a:solidFill>
-                  <a:srgbClr val="FF0000"/>
-                </a:solidFill>
-                <a:effectLst>
-                  <a:outerShdw blurRad="38100" dist="38100" dir="2700000" algn="tl">
-                    <a:srgbClr val="000000">
-                      <a:alpha val="43137"/>
-                    </a:srgbClr>
-                  </a:outerShdw>
-                </a:effectLst>
-              </a:rPr>
-              <a:t>NDA</a:t>
-            </a:r>
-            <a:r>
-              <a:rPr lang="en-CA" dirty="0"/>
-              <a:t> </a:t>
-            </a:r>
-            <a:endParaRPr lang="en-US" dirty="0"/>
+              <a:rPr lang="en-US" dirty="0"/>
+              <a:t>CONS</a:t>
+            </a:r>
+          </a:p>
+        </p:txBody>
+      </p:sp>
+      <p:sp>
+        <p:nvSpPr>
+          <p:cNvPr id="8" name="Content Placeholder 7">
+            <a:extLst>
+              <a:ext uri="{FF2B5EF4-FFF2-40B4-BE49-F238E27FC236}">
+                <a16:creationId xmlns:a16="http://schemas.microsoft.com/office/drawing/2014/main" id="{6AE6B0FC-6B08-483E-A783-84F151D2DE7B}"/>
+              </a:ext>
+            </a:extLst>
+          </p:cNvPr>
+          <p:cNvSpPr>
+            <a:spLocks noGrp="1"/>
+          </p:cNvSpPr>
+          <p:nvPr>
+            <p:ph sz="quarter" idx="4"/>
+          </p:nvPr>
+        </p:nvSpPr>
+        <p:spPr/>
+        <p:txBody>
+          <a:bodyPr>
+            <a:normAutofit fontScale="92500" lnSpcReduction="10000"/>
+          </a:bodyPr>
+          <a:lstStyle/>
+          <a:p>
+            <a:r>
+              <a:rPr lang="en-US" dirty="0"/>
+              <a:t>The Steffen-Issue</a:t>
+            </a:r>
+          </a:p>
+          <a:p>
+            <a:r>
+              <a:rPr lang="en-US" dirty="0"/>
+              <a:t>Breaking Changes to V2 Preview</a:t>
+            </a:r>
+          </a:p>
+          <a:p>
+            <a:r>
+              <a:rPr lang="en-US" dirty="0"/>
+              <a:t>C#/F# Worker still In-Proc</a:t>
+            </a:r>
+          </a:p>
+          <a:p>
+            <a:r>
+              <a:rPr lang="en-US" dirty="0"/>
+              <a:t>Only one language per Function App supported</a:t>
+            </a:r>
           </a:p>
         </p:txBody>
       </p:sp>
@@ -8421,14 +8951,6 @@
             </a:r>
             <a:r>
               <a:rPr lang="en-CA" dirty="0" err="1"/>
-              <a:t>U</a:t>
-            </a:r>
-            <a:r>
-              <a:rPr lang="en-CA" cap="none" dirty="0" err="1"/>
-              <a:t>ber</a:t>
-            </a:r>
-            <a:r>
-              <a:rPr lang="en-CA" dirty="0" err="1"/>
               <a:t>Next</a:t>
             </a:r>
             <a:endParaRPr lang="en-US" dirty="0"/>
@@ -8457,9 +8979,32 @@
           <a:lstStyle/>
           <a:p>
             <a:r>
+              <a:rPr lang="en-CA" dirty="0" err="1"/>
+              <a:t>gRPC</a:t>
+            </a:r>
+            <a:r>
               <a:rPr lang="en-CA" dirty="0"/>
-              <a:t>BYOW</a:t>
-            </a:r>
+              <a:t> for all Languages</a:t>
+            </a:r>
+          </a:p>
+          <a:p>
+            <a:r>
+              <a:rPr lang="en-CA" dirty="0"/>
+              <a:t>Worker-side bindings</a:t>
+            </a:r>
+          </a:p>
+          <a:p>
+            <a:r>
+              <a:rPr lang="en-CA" dirty="0"/>
+              <a:t>BYOW </a:t>
+            </a:r>
+            <a:r>
+              <a:rPr lang="en-CA" dirty="0">
+                <a:sym typeface="Wingdings" panose="05000000000000000000" pitchFamily="2" charset="2"/>
+              </a:rPr>
+              <a:t> Solve Steffen-Issue</a:t>
+            </a:r>
+            <a:endParaRPr lang="en-CA" dirty="0"/>
           </a:p>
           <a:p>
             <a:r>
@@ -8656,7 +9201,7 @@
             </a:r>
             <a:r>
               <a:rPr lang="en-US" sz="1400" i="1" dirty="0"/>
-              <a:t>* No concrete plans yet</a:t>
+              <a:t>* one possibility for the future</a:t>
             </a:r>
             <a:endParaRPr lang="en-CA" sz="1400" i="1" dirty="0"/>
           </a:p>

</xml_diff>

<commit_message>
Added AzureFunctionsV2 presentation. updated AzureFunctionsDeepDive presentation
</commit_message>
<xml_diff>
--- a/AzureFunctionsDeepDive.pptx
+++ b/AzureFunctionsDeepDive.pptx
@@ -6848,7 +6848,15 @@
           <a:bodyPr/>
           <a:lstStyle/>
           <a:p>
-            <a:endParaRPr lang="en-US"/>
+            <a:r>
+              <a:rPr lang="en-US" dirty="0"/>
+              <a:t>This is </a:t>
+            </a:r>
+            <a:r>
+              <a:rPr lang="en-US" dirty="0" err="1"/>
+              <a:t>Fablehaft</a:t>
+            </a:r>
+            <a:endParaRPr lang="en-US" dirty="0"/>
           </a:p>
         </p:txBody>
       </p:sp>

</xml_diff>